<commit_message>
ppt angular en react updated
</commit_message>
<xml_diff>
--- a/frontend-cursus/ 0 - Agenda.pptx
+++ b/frontend-cursus/ 0 - Agenda.pptx
@@ -5,11 +5,12 @@
     <p:sldMasterId id="2147483660" r:id="rId1"/>
   </p:sldMasterIdLst>
   <p:notesMasterIdLst>
-    <p:notesMasterId r:id="rId4"/>
+    <p:notesMasterId r:id="rId5"/>
   </p:notesMasterIdLst>
   <p:sldIdLst>
     <p:sldId id="257" r:id="rId2"/>
     <p:sldId id="258" r:id="rId3"/>
+    <p:sldId id="259" r:id="rId4"/>
   </p:sldIdLst>
   <p:sldSz cx="13004800" cy="9753600"/>
   <p:notesSz cx="6858000" cy="9144000"/>
@@ -762,6 +763,112 @@
 </p:notes>
 </file>
 
+<file path=ppt/notesSlides/notesSlide3.xml><?xml version="1.0" encoding="utf-8"?>
+<p:notes xmlns:a="http://schemas.openxmlformats.org/drawingml/2006/main" xmlns:r="http://schemas.openxmlformats.org/officeDocument/2006/relationships" xmlns:p="http://schemas.openxmlformats.org/presentationml/2006/main" showMasterSp="0" showMasterPhAnim="0">
+  <p:cSld>
+    <p:spTree>
+      <p:nvGrpSpPr>
+        <p:cNvPr id="1" name="Shape 61"/>
+        <p:cNvGrpSpPr/>
+        <p:nvPr/>
+      </p:nvGrpSpPr>
+      <p:grpSpPr>
+        <a:xfrm>
+          <a:off x="0" y="0"/>
+          <a:ext cx="0" cy="0"/>
+          <a:chOff x="0" y="0"/>
+          <a:chExt cx="0" cy="0"/>
+        </a:xfrm>
+      </p:grpSpPr>
+      <p:sp>
+        <p:nvSpPr>
+          <p:cNvPr id="62" name="Shape 62"/>
+          <p:cNvSpPr>
+            <a:spLocks noGrp="1" noRot="1" noChangeAspect="1"/>
+          </p:cNvSpPr>
+          <p:nvPr>
+            <p:ph type="sldImg" idx="2"/>
+          </p:nvPr>
+        </p:nvSpPr>
+        <p:spPr>
+          <a:xfrm>
+            <a:off x="1143000" y="685800"/>
+            <a:ext cx="4572000" cy="3429000"/>
+          </a:xfrm>
+          <a:custGeom>
+            <a:avLst/>
+            <a:gdLst/>
+            <a:ahLst/>
+            <a:cxnLst/>
+            <a:rect l="0" t="0" r="0" b="0"/>
+            <a:pathLst>
+              <a:path w="120000" h="120000" extrusionOk="0">
+                <a:moveTo>
+                  <a:pt x="0" y="0"/>
+                </a:moveTo>
+                <a:lnTo>
+                  <a:pt x="120000" y="0"/>
+                </a:lnTo>
+                <a:lnTo>
+                  <a:pt x="120000" y="120000"/>
+                </a:lnTo>
+                <a:lnTo>
+                  <a:pt x="0" y="120000"/>
+                </a:lnTo>
+                <a:close/>
+              </a:path>
+            </a:pathLst>
+          </a:custGeom>
+        </p:spPr>
+      </p:sp>
+      <p:sp>
+        <p:nvSpPr>
+          <p:cNvPr id="63" name="Shape 63"/>
+          <p:cNvSpPr txBox="1">
+            <a:spLocks noGrp="1"/>
+          </p:cNvSpPr>
+          <p:nvPr>
+            <p:ph type="body" idx="1"/>
+          </p:nvPr>
+        </p:nvSpPr>
+        <p:spPr>
+          <a:xfrm>
+            <a:off x="914400" y="4343400"/>
+            <a:ext cx="5029200" cy="4114800"/>
+          </a:xfrm>
+          <a:prstGeom prst="rect">
+            <a:avLst/>
+          </a:prstGeom>
+        </p:spPr>
+        <p:txBody>
+          <a:bodyPr lIns="91425" tIns="91425" rIns="91425" bIns="91425" anchor="t" anchorCtr="0">
+            <a:noAutofit/>
+          </a:bodyPr>
+          <a:lstStyle/>
+          <a:p>
+            <a:pPr lvl="0">
+              <a:spcBef>
+                <a:spcPts val="0"/>
+              </a:spcBef>
+              <a:buNone/>
+            </a:pPr>
+            <a:endParaRPr/>
+          </a:p>
+        </p:txBody>
+      </p:sp>
+    </p:spTree>
+    <p:extLst>
+      <p:ext uri="{BB962C8B-B14F-4D97-AF65-F5344CB8AC3E}">
+        <p14:creationId xmlns:p14="http://schemas.microsoft.com/office/powerpoint/2010/main" val="1078953014"/>
+      </p:ext>
+    </p:extLst>
+  </p:cSld>
+  <p:clrMapOvr>
+    <a:masterClrMapping/>
+  </p:clrMapOvr>
+</p:notes>
+</file>
+
 <file path=ppt/slideLayouts/slideLayout1.xml><?xml version="1.0" encoding="utf-8"?>
 <p:sldLayout xmlns:a="http://schemas.openxmlformats.org/drawingml/2006/main" xmlns:r="http://schemas.openxmlformats.org/officeDocument/2006/relationships" xmlns:p="http://schemas.openxmlformats.org/presentationml/2006/main" type="tx">
   <p:cSld name="Title &amp; Bullets">
@@ -1380,981 +1487,7 @@
 </p:sldLayout>
 </file>
 
-<file path=ppt/slideLayouts/slideLayout10.xml><?xml version="1.0" encoding="utf-8"?>
-<p:sldLayout xmlns:a="http://schemas.openxmlformats.org/drawingml/2006/main" xmlns:r="http://schemas.openxmlformats.org/officeDocument/2006/relationships" xmlns:p="http://schemas.openxmlformats.org/presentationml/2006/main">
-  <p:cSld name="Blank">
-    <p:spTree>
-      <p:nvGrpSpPr>
-        <p:cNvPr id="1" name="Shape 53"/>
-        <p:cNvGrpSpPr/>
-        <p:nvPr/>
-      </p:nvGrpSpPr>
-      <p:grpSpPr>
-        <a:xfrm>
-          <a:off x="0" y="0"/>
-          <a:ext cx="0" cy="0"/>
-          <a:chOff x="0" y="0"/>
-          <a:chExt cx="0" cy="0"/>
-        </a:xfrm>
-      </p:grpSpPr>
-      <p:sp>
-        <p:nvSpPr>
-          <p:cNvPr id="54" name="Shape 54"/>
-          <p:cNvSpPr txBox="1">
-            <a:spLocks noGrp="1"/>
-          </p:cNvSpPr>
-          <p:nvPr>
-            <p:ph type="sldNum" idx="12"/>
-          </p:nvPr>
-        </p:nvSpPr>
-        <p:spPr>
-          <a:xfrm>
-            <a:off x="6311798" y="9258300"/>
-            <a:ext cx="368504" cy="381000"/>
-          </a:xfrm>
-          <a:prstGeom prst="rect">
-            <a:avLst/>
-          </a:prstGeom>
-          <a:noFill/>
-          <a:ln>
-            <a:noFill/>
-          </a:ln>
-        </p:spPr>
-        <p:txBody>
-          <a:bodyPr lIns="50800" tIns="50800" rIns="50800" bIns="50800" anchor="t" anchorCtr="0">
-            <a:noAutofit/>
-          </a:bodyPr>
-          <a:lstStyle/>
-          <a:p>
-            <a:pPr marL="0" marR="0" lvl="0" indent="0" algn="ctr" rtl="0">
-              <a:lnSpc>
-                <a:spcPct val="100000"/>
-              </a:lnSpc>
-              <a:spcBef>
-                <a:spcPts val="0"/>
-              </a:spcBef>
-              <a:spcAft>
-                <a:spcPts val="0"/>
-              </a:spcAft>
-              <a:buClr>
-                <a:srgbClr val="FFFFFF"/>
-              </a:buClr>
-              <a:buSzPct val="25000"/>
-              <a:buFont typeface="Helvetica Neue"/>
-              <a:buNone/>
-            </a:pPr>
-            <a:fld id="{00000000-1234-1234-1234-123412341234}" type="slidenum">
-              <a:rPr lang="en-US" sz="1800" b="0" i="0" u="none" strike="noStrike" cap="none">
-                <a:solidFill>
-                  <a:srgbClr val="FFFFFF"/>
-                </a:solidFill>
-                <a:latin typeface="Helvetica Neue"/>
-                <a:ea typeface="Helvetica Neue"/>
-                <a:cs typeface="Helvetica Neue"/>
-                <a:sym typeface="Helvetica Neue"/>
-              </a:rPr>
-              <a:t>‹#›</a:t>
-            </a:fld>
-            <a:endParaRPr lang="en-US" sz="1800" b="0" i="0" u="none" strike="noStrike" cap="none">
-              <a:solidFill>
-                <a:srgbClr val="FFFFFF"/>
-              </a:solidFill>
-              <a:latin typeface="Helvetica Neue"/>
-              <a:ea typeface="Helvetica Neue"/>
-              <a:cs typeface="Helvetica Neue"/>
-              <a:sym typeface="Helvetica Neue"/>
-            </a:endParaRPr>
-          </a:p>
-        </p:txBody>
-      </p:sp>
-    </p:spTree>
-  </p:cSld>
-  <p:clrMapOvr>
-    <a:masterClrMapping/>
-  </p:clrMapOvr>
-</p:sldLayout>
-</file>
-
 <file path=ppt/slideLayouts/slideLayout2.xml><?xml version="1.0" encoding="utf-8"?>
-<p:sldLayout xmlns:a="http://schemas.openxmlformats.org/drawingml/2006/main" xmlns:r="http://schemas.openxmlformats.org/officeDocument/2006/relationships" xmlns:p="http://schemas.openxmlformats.org/presentationml/2006/main">
-  <p:cSld name="Photo - Horizontal">
-    <p:spTree>
-      <p:nvGrpSpPr>
-        <p:cNvPr id="1" name="Shape 17"/>
-        <p:cNvGrpSpPr/>
-        <p:nvPr/>
-      </p:nvGrpSpPr>
-      <p:grpSpPr>
-        <a:xfrm>
-          <a:off x="0" y="0"/>
-          <a:ext cx="0" cy="0"/>
-          <a:chOff x="0" y="0"/>
-          <a:chExt cx="0" cy="0"/>
-        </a:xfrm>
-      </p:grpSpPr>
-      <p:sp>
-        <p:nvSpPr>
-          <p:cNvPr id="18" name="Shape 18"/>
-          <p:cNvSpPr>
-            <a:spLocks noGrp="1"/>
-          </p:cNvSpPr>
-          <p:nvPr>
-            <p:ph type="pic" idx="2"/>
-          </p:nvPr>
-        </p:nvSpPr>
-        <p:spPr>
-          <a:xfrm>
-            <a:off x="1619250" y="660400"/>
-            <a:ext cx="9758015" cy="5905500"/>
-          </a:xfrm>
-          <a:prstGeom prst="rect">
-            <a:avLst/>
-          </a:prstGeom>
-          <a:noFill/>
-          <a:ln>
-            <a:noFill/>
-          </a:ln>
-        </p:spPr>
-        <p:txBody>
-          <a:bodyPr lIns="91425" tIns="91425" rIns="91425" bIns="91425" anchor="t" anchorCtr="0"/>
-          <a:lstStyle>
-            <a:lvl1pPr marL="444500" marR="0" lvl="0" indent="-263525" algn="l" rtl="0">
-              <a:lnSpc>
-                <a:spcPct val="100000"/>
-              </a:lnSpc>
-              <a:spcBef>
-                <a:spcPts val="4200"/>
-              </a:spcBef>
-              <a:spcAft>
-                <a:spcPts val="0"/>
-              </a:spcAft>
-              <a:buClr>
-                <a:srgbClr val="FFFFFF"/>
-              </a:buClr>
-              <a:buSzPct val="75000"/>
-              <a:buFont typeface="Helvetica Neue"/>
-              <a:buChar char="•"/>
-              <a:defRPr sz="3800" b="0" i="0" u="none" strike="noStrike" cap="none">
-                <a:solidFill>
-                  <a:srgbClr val="FFFFFF"/>
-                </a:solidFill>
-                <a:latin typeface="Helvetica Neue"/>
-                <a:ea typeface="Helvetica Neue"/>
-                <a:cs typeface="Helvetica Neue"/>
-                <a:sym typeface="Helvetica Neue"/>
-              </a:defRPr>
-            </a:lvl1pPr>
-            <a:lvl2pPr marL="889000" marR="0" lvl="1" indent="-263525" algn="l" rtl="0">
-              <a:lnSpc>
-                <a:spcPct val="100000"/>
-              </a:lnSpc>
-              <a:spcBef>
-                <a:spcPts val="4200"/>
-              </a:spcBef>
-              <a:spcAft>
-                <a:spcPts val="0"/>
-              </a:spcAft>
-              <a:buClr>
-                <a:srgbClr val="FFFFFF"/>
-              </a:buClr>
-              <a:buSzPct val="75000"/>
-              <a:buFont typeface="Helvetica Neue"/>
-              <a:buChar char="•"/>
-              <a:defRPr sz="3800" b="0" i="0" u="none" strike="noStrike" cap="none">
-                <a:solidFill>
-                  <a:srgbClr val="FFFFFF"/>
-                </a:solidFill>
-                <a:latin typeface="Helvetica Neue"/>
-                <a:ea typeface="Helvetica Neue"/>
-                <a:cs typeface="Helvetica Neue"/>
-                <a:sym typeface="Helvetica Neue"/>
-              </a:defRPr>
-            </a:lvl2pPr>
-            <a:lvl3pPr marL="1333500" marR="0" lvl="2" indent="-263525" algn="l" rtl="0">
-              <a:lnSpc>
-                <a:spcPct val="100000"/>
-              </a:lnSpc>
-              <a:spcBef>
-                <a:spcPts val="4200"/>
-              </a:spcBef>
-              <a:spcAft>
-                <a:spcPts val="0"/>
-              </a:spcAft>
-              <a:buClr>
-                <a:srgbClr val="FFFFFF"/>
-              </a:buClr>
-              <a:buSzPct val="75000"/>
-              <a:buFont typeface="Helvetica Neue"/>
-              <a:buChar char="•"/>
-              <a:defRPr sz="3800" b="0" i="0" u="none" strike="noStrike" cap="none">
-                <a:solidFill>
-                  <a:srgbClr val="FFFFFF"/>
-                </a:solidFill>
-                <a:latin typeface="Helvetica Neue"/>
-                <a:ea typeface="Helvetica Neue"/>
-                <a:cs typeface="Helvetica Neue"/>
-                <a:sym typeface="Helvetica Neue"/>
-              </a:defRPr>
-            </a:lvl3pPr>
-            <a:lvl4pPr marL="1778000" marR="0" lvl="3" indent="-263525" algn="l" rtl="0">
-              <a:lnSpc>
-                <a:spcPct val="100000"/>
-              </a:lnSpc>
-              <a:spcBef>
-                <a:spcPts val="4200"/>
-              </a:spcBef>
-              <a:spcAft>
-                <a:spcPts val="0"/>
-              </a:spcAft>
-              <a:buClr>
-                <a:srgbClr val="FFFFFF"/>
-              </a:buClr>
-              <a:buSzPct val="75000"/>
-              <a:buFont typeface="Helvetica Neue"/>
-              <a:buChar char="•"/>
-              <a:defRPr sz="3800" b="0" i="0" u="none" strike="noStrike" cap="none">
-                <a:solidFill>
-                  <a:srgbClr val="FFFFFF"/>
-                </a:solidFill>
-                <a:latin typeface="Helvetica Neue"/>
-                <a:ea typeface="Helvetica Neue"/>
-                <a:cs typeface="Helvetica Neue"/>
-                <a:sym typeface="Helvetica Neue"/>
-              </a:defRPr>
-            </a:lvl4pPr>
-            <a:lvl5pPr marL="2222500" marR="0" lvl="4" indent="-263525" algn="l" rtl="0">
-              <a:lnSpc>
-                <a:spcPct val="100000"/>
-              </a:lnSpc>
-              <a:spcBef>
-                <a:spcPts val="4200"/>
-              </a:spcBef>
-              <a:spcAft>
-                <a:spcPts val="0"/>
-              </a:spcAft>
-              <a:buClr>
-                <a:srgbClr val="FFFFFF"/>
-              </a:buClr>
-              <a:buSzPct val="75000"/>
-              <a:buFont typeface="Helvetica Neue"/>
-              <a:buChar char="•"/>
-              <a:defRPr sz="3800" b="0" i="0" u="none" strike="noStrike" cap="none">
-                <a:solidFill>
-                  <a:srgbClr val="FFFFFF"/>
-                </a:solidFill>
-                <a:latin typeface="Helvetica Neue"/>
-                <a:ea typeface="Helvetica Neue"/>
-                <a:cs typeface="Helvetica Neue"/>
-                <a:sym typeface="Helvetica Neue"/>
-              </a:defRPr>
-            </a:lvl5pPr>
-            <a:lvl6pPr marL="2667000" marR="0" lvl="5" indent="-263525" algn="l" rtl="0">
-              <a:lnSpc>
-                <a:spcPct val="100000"/>
-              </a:lnSpc>
-              <a:spcBef>
-                <a:spcPts val="4200"/>
-              </a:spcBef>
-              <a:spcAft>
-                <a:spcPts val="0"/>
-              </a:spcAft>
-              <a:buClr>
-                <a:srgbClr val="FFFFFF"/>
-              </a:buClr>
-              <a:buSzPct val="75000"/>
-              <a:buFont typeface="Helvetica Neue"/>
-              <a:buChar char="•"/>
-              <a:defRPr sz="3800" b="0" i="0" u="none" strike="noStrike" cap="none">
-                <a:solidFill>
-                  <a:srgbClr val="FFFFFF"/>
-                </a:solidFill>
-                <a:latin typeface="Helvetica Neue"/>
-                <a:ea typeface="Helvetica Neue"/>
-                <a:cs typeface="Helvetica Neue"/>
-                <a:sym typeface="Helvetica Neue"/>
-              </a:defRPr>
-            </a:lvl6pPr>
-            <a:lvl7pPr marL="3111500" marR="0" lvl="6" indent="-263525" algn="l" rtl="0">
-              <a:lnSpc>
-                <a:spcPct val="100000"/>
-              </a:lnSpc>
-              <a:spcBef>
-                <a:spcPts val="4200"/>
-              </a:spcBef>
-              <a:spcAft>
-                <a:spcPts val="0"/>
-              </a:spcAft>
-              <a:buClr>
-                <a:srgbClr val="FFFFFF"/>
-              </a:buClr>
-              <a:buSzPct val="75000"/>
-              <a:buFont typeface="Helvetica Neue"/>
-              <a:buChar char="•"/>
-              <a:defRPr sz="3800" b="0" i="0" u="none" strike="noStrike" cap="none">
-                <a:solidFill>
-                  <a:srgbClr val="FFFFFF"/>
-                </a:solidFill>
-                <a:latin typeface="Helvetica Neue"/>
-                <a:ea typeface="Helvetica Neue"/>
-                <a:cs typeface="Helvetica Neue"/>
-                <a:sym typeface="Helvetica Neue"/>
-              </a:defRPr>
-            </a:lvl7pPr>
-            <a:lvl8pPr marL="3556000" marR="0" lvl="7" indent="-263525" algn="l" rtl="0">
-              <a:lnSpc>
-                <a:spcPct val="100000"/>
-              </a:lnSpc>
-              <a:spcBef>
-                <a:spcPts val="4200"/>
-              </a:spcBef>
-              <a:spcAft>
-                <a:spcPts val="0"/>
-              </a:spcAft>
-              <a:buClr>
-                <a:srgbClr val="FFFFFF"/>
-              </a:buClr>
-              <a:buSzPct val="75000"/>
-              <a:buFont typeface="Helvetica Neue"/>
-              <a:buChar char="•"/>
-              <a:defRPr sz="3800" b="0" i="0" u="none" strike="noStrike" cap="none">
-                <a:solidFill>
-                  <a:srgbClr val="FFFFFF"/>
-                </a:solidFill>
-                <a:latin typeface="Helvetica Neue"/>
-                <a:ea typeface="Helvetica Neue"/>
-                <a:cs typeface="Helvetica Neue"/>
-                <a:sym typeface="Helvetica Neue"/>
-              </a:defRPr>
-            </a:lvl8pPr>
-            <a:lvl9pPr marL="4000500" marR="0" lvl="8" indent="-263525" algn="l" rtl="0">
-              <a:lnSpc>
-                <a:spcPct val="100000"/>
-              </a:lnSpc>
-              <a:spcBef>
-                <a:spcPts val="4200"/>
-              </a:spcBef>
-              <a:spcAft>
-                <a:spcPts val="0"/>
-              </a:spcAft>
-              <a:buClr>
-                <a:srgbClr val="FFFFFF"/>
-              </a:buClr>
-              <a:buSzPct val="75000"/>
-              <a:buFont typeface="Helvetica Neue"/>
-              <a:buChar char="•"/>
-              <a:defRPr sz="3800" b="0" i="0" u="none" strike="noStrike" cap="none">
-                <a:solidFill>
-                  <a:srgbClr val="FFFFFF"/>
-                </a:solidFill>
-                <a:latin typeface="Helvetica Neue"/>
-                <a:ea typeface="Helvetica Neue"/>
-                <a:cs typeface="Helvetica Neue"/>
-                <a:sym typeface="Helvetica Neue"/>
-              </a:defRPr>
-            </a:lvl9pPr>
-          </a:lstStyle>
-          <a:p>
-            <a:endParaRPr/>
-          </a:p>
-        </p:txBody>
-      </p:sp>
-      <p:sp>
-        <p:nvSpPr>
-          <p:cNvPr id="19" name="Shape 19"/>
-          <p:cNvSpPr txBox="1">
-            <a:spLocks noGrp="1"/>
-          </p:cNvSpPr>
-          <p:nvPr>
-            <p:ph type="title"/>
-          </p:nvPr>
-        </p:nvSpPr>
-        <p:spPr>
-          <a:xfrm>
-            <a:off x="1270000" y="6718300"/>
-            <a:ext cx="10464800" cy="1422400"/>
-          </a:xfrm>
-          <a:prstGeom prst="rect">
-            <a:avLst/>
-          </a:prstGeom>
-          <a:noFill/>
-          <a:ln>
-            <a:noFill/>
-          </a:ln>
-        </p:spPr>
-        <p:txBody>
-          <a:bodyPr lIns="91425" tIns="91425" rIns="91425" bIns="91425" anchor="ctr" anchorCtr="0"/>
-          <a:lstStyle>
-            <a:lvl1pPr marL="0" marR="0" lvl="0" indent="0" algn="ctr" rtl="0">
-              <a:lnSpc>
-                <a:spcPct val="100000"/>
-              </a:lnSpc>
-              <a:spcBef>
-                <a:spcPts val="0"/>
-              </a:spcBef>
-              <a:spcAft>
-                <a:spcPts val="0"/>
-              </a:spcAft>
-              <a:buClr>
-                <a:srgbClr val="FFFFFF"/>
-              </a:buClr>
-              <a:buFont typeface="Helvetica Neue"/>
-              <a:buNone/>
-              <a:defRPr sz="8000" b="0" i="0" u="none" strike="noStrike" cap="none">
-                <a:solidFill>
-                  <a:srgbClr val="FFFFFF"/>
-                </a:solidFill>
-                <a:latin typeface="Helvetica Neue"/>
-                <a:ea typeface="Helvetica Neue"/>
-                <a:cs typeface="Helvetica Neue"/>
-                <a:sym typeface="Helvetica Neue"/>
-              </a:defRPr>
-            </a:lvl1pPr>
-            <a:lvl2pPr marL="0" marR="0" lvl="1" indent="228600" algn="ctr" rtl="0">
-              <a:lnSpc>
-                <a:spcPct val="100000"/>
-              </a:lnSpc>
-              <a:spcBef>
-                <a:spcPts val="0"/>
-              </a:spcBef>
-              <a:spcAft>
-                <a:spcPts val="0"/>
-              </a:spcAft>
-              <a:buClr>
-                <a:srgbClr val="FFFFFF"/>
-              </a:buClr>
-              <a:buFont typeface="Helvetica Neue"/>
-              <a:buNone/>
-              <a:defRPr sz="8000" b="0" i="0" u="none" strike="noStrike" cap="none">
-                <a:solidFill>
-                  <a:srgbClr val="FFFFFF"/>
-                </a:solidFill>
-                <a:latin typeface="Helvetica Neue"/>
-                <a:ea typeface="Helvetica Neue"/>
-                <a:cs typeface="Helvetica Neue"/>
-                <a:sym typeface="Helvetica Neue"/>
-              </a:defRPr>
-            </a:lvl2pPr>
-            <a:lvl3pPr marL="0" marR="0" lvl="2" indent="457200" algn="ctr" rtl="0">
-              <a:lnSpc>
-                <a:spcPct val="100000"/>
-              </a:lnSpc>
-              <a:spcBef>
-                <a:spcPts val="0"/>
-              </a:spcBef>
-              <a:spcAft>
-                <a:spcPts val="0"/>
-              </a:spcAft>
-              <a:buClr>
-                <a:srgbClr val="FFFFFF"/>
-              </a:buClr>
-              <a:buFont typeface="Helvetica Neue"/>
-              <a:buNone/>
-              <a:defRPr sz="8000" b="0" i="0" u="none" strike="noStrike" cap="none">
-                <a:solidFill>
-                  <a:srgbClr val="FFFFFF"/>
-                </a:solidFill>
-                <a:latin typeface="Helvetica Neue"/>
-                <a:ea typeface="Helvetica Neue"/>
-                <a:cs typeface="Helvetica Neue"/>
-                <a:sym typeface="Helvetica Neue"/>
-              </a:defRPr>
-            </a:lvl3pPr>
-            <a:lvl4pPr marL="0" marR="0" lvl="3" indent="685800" algn="ctr" rtl="0">
-              <a:lnSpc>
-                <a:spcPct val="100000"/>
-              </a:lnSpc>
-              <a:spcBef>
-                <a:spcPts val="0"/>
-              </a:spcBef>
-              <a:spcAft>
-                <a:spcPts val="0"/>
-              </a:spcAft>
-              <a:buClr>
-                <a:srgbClr val="FFFFFF"/>
-              </a:buClr>
-              <a:buFont typeface="Helvetica Neue"/>
-              <a:buNone/>
-              <a:defRPr sz="8000" b="0" i="0" u="none" strike="noStrike" cap="none">
-                <a:solidFill>
-                  <a:srgbClr val="FFFFFF"/>
-                </a:solidFill>
-                <a:latin typeface="Helvetica Neue"/>
-                <a:ea typeface="Helvetica Neue"/>
-                <a:cs typeface="Helvetica Neue"/>
-                <a:sym typeface="Helvetica Neue"/>
-              </a:defRPr>
-            </a:lvl4pPr>
-            <a:lvl5pPr marL="0" marR="0" lvl="4" indent="914400" algn="ctr" rtl="0">
-              <a:lnSpc>
-                <a:spcPct val="100000"/>
-              </a:lnSpc>
-              <a:spcBef>
-                <a:spcPts val="0"/>
-              </a:spcBef>
-              <a:spcAft>
-                <a:spcPts val="0"/>
-              </a:spcAft>
-              <a:buClr>
-                <a:srgbClr val="FFFFFF"/>
-              </a:buClr>
-              <a:buFont typeface="Helvetica Neue"/>
-              <a:buNone/>
-              <a:defRPr sz="8000" b="0" i="0" u="none" strike="noStrike" cap="none">
-                <a:solidFill>
-                  <a:srgbClr val="FFFFFF"/>
-                </a:solidFill>
-                <a:latin typeface="Helvetica Neue"/>
-                <a:ea typeface="Helvetica Neue"/>
-                <a:cs typeface="Helvetica Neue"/>
-                <a:sym typeface="Helvetica Neue"/>
-              </a:defRPr>
-            </a:lvl5pPr>
-            <a:lvl6pPr marL="0" marR="0" lvl="5" indent="1143000" algn="ctr" rtl="0">
-              <a:lnSpc>
-                <a:spcPct val="100000"/>
-              </a:lnSpc>
-              <a:spcBef>
-                <a:spcPts val="0"/>
-              </a:spcBef>
-              <a:spcAft>
-                <a:spcPts val="0"/>
-              </a:spcAft>
-              <a:buClr>
-                <a:srgbClr val="FFFFFF"/>
-              </a:buClr>
-              <a:buFont typeface="Helvetica Neue"/>
-              <a:buNone/>
-              <a:defRPr sz="8000" b="0" i="0" u="none" strike="noStrike" cap="none">
-                <a:solidFill>
-                  <a:srgbClr val="FFFFFF"/>
-                </a:solidFill>
-                <a:latin typeface="Helvetica Neue"/>
-                <a:ea typeface="Helvetica Neue"/>
-                <a:cs typeface="Helvetica Neue"/>
-                <a:sym typeface="Helvetica Neue"/>
-              </a:defRPr>
-            </a:lvl6pPr>
-            <a:lvl7pPr marL="0" marR="0" lvl="6" indent="1371600" algn="ctr" rtl="0">
-              <a:lnSpc>
-                <a:spcPct val="100000"/>
-              </a:lnSpc>
-              <a:spcBef>
-                <a:spcPts val="0"/>
-              </a:spcBef>
-              <a:spcAft>
-                <a:spcPts val="0"/>
-              </a:spcAft>
-              <a:buClr>
-                <a:srgbClr val="FFFFFF"/>
-              </a:buClr>
-              <a:buFont typeface="Helvetica Neue"/>
-              <a:buNone/>
-              <a:defRPr sz="8000" b="0" i="0" u="none" strike="noStrike" cap="none">
-                <a:solidFill>
-                  <a:srgbClr val="FFFFFF"/>
-                </a:solidFill>
-                <a:latin typeface="Helvetica Neue"/>
-                <a:ea typeface="Helvetica Neue"/>
-                <a:cs typeface="Helvetica Neue"/>
-                <a:sym typeface="Helvetica Neue"/>
-              </a:defRPr>
-            </a:lvl7pPr>
-            <a:lvl8pPr marL="0" marR="0" lvl="7" indent="1600200" algn="ctr" rtl="0">
-              <a:lnSpc>
-                <a:spcPct val="100000"/>
-              </a:lnSpc>
-              <a:spcBef>
-                <a:spcPts val="0"/>
-              </a:spcBef>
-              <a:spcAft>
-                <a:spcPts val="0"/>
-              </a:spcAft>
-              <a:buClr>
-                <a:srgbClr val="FFFFFF"/>
-              </a:buClr>
-              <a:buFont typeface="Helvetica Neue"/>
-              <a:buNone/>
-              <a:defRPr sz="8000" b="0" i="0" u="none" strike="noStrike" cap="none">
-                <a:solidFill>
-                  <a:srgbClr val="FFFFFF"/>
-                </a:solidFill>
-                <a:latin typeface="Helvetica Neue"/>
-                <a:ea typeface="Helvetica Neue"/>
-                <a:cs typeface="Helvetica Neue"/>
-                <a:sym typeface="Helvetica Neue"/>
-              </a:defRPr>
-            </a:lvl8pPr>
-            <a:lvl9pPr marL="0" marR="0" lvl="8" indent="1828800" algn="ctr" rtl="0">
-              <a:lnSpc>
-                <a:spcPct val="100000"/>
-              </a:lnSpc>
-              <a:spcBef>
-                <a:spcPts val="0"/>
-              </a:spcBef>
-              <a:spcAft>
-                <a:spcPts val="0"/>
-              </a:spcAft>
-              <a:buClr>
-                <a:srgbClr val="FFFFFF"/>
-              </a:buClr>
-              <a:buFont typeface="Helvetica Neue"/>
-              <a:buNone/>
-              <a:defRPr sz="8000" b="0" i="0" u="none" strike="noStrike" cap="none">
-                <a:solidFill>
-                  <a:srgbClr val="FFFFFF"/>
-                </a:solidFill>
-                <a:latin typeface="Helvetica Neue"/>
-                <a:ea typeface="Helvetica Neue"/>
-                <a:cs typeface="Helvetica Neue"/>
-                <a:sym typeface="Helvetica Neue"/>
-              </a:defRPr>
-            </a:lvl9pPr>
-          </a:lstStyle>
-          <a:p>
-            <a:endParaRPr/>
-          </a:p>
-        </p:txBody>
-      </p:sp>
-      <p:sp>
-        <p:nvSpPr>
-          <p:cNvPr id="20" name="Shape 20"/>
-          <p:cNvSpPr txBox="1">
-            <a:spLocks noGrp="1"/>
-          </p:cNvSpPr>
-          <p:nvPr>
-            <p:ph type="body" idx="1"/>
-          </p:nvPr>
-        </p:nvSpPr>
-        <p:spPr>
-          <a:xfrm>
-            <a:off x="1270000" y="8191500"/>
-            <a:ext cx="10464800" cy="1130299"/>
-          </a:xfrm>
-          <a:prstGeom prst="rect">
-            <a:avLst/>
-          </a:prstGeom>
-          <a:noFill/>
-          <a:ln>
-            <a:noFill/>
-          </a:ln>
-        </p:spPr>
-        <p:txBody>
-          <a:bodyPr lIns="91425" tIns="91425" rIns="91425" bIns="91425" anchor="t" anchorCtr="0"/>
-          <a:lstStyle>
-            <a:lvl1pPr marL="0" marR="0" lvl="0" indent="0" algn="ctr" rtl="0">
-              <a:lnSpc>
-                <a:spcPct val="100000"/>
-              </a:lnSpc>
-              <a:spcBef>
-                <a:spcPts val="0"/>
-              </a:spcBef>
-              <a:spcAft>
-                <a:spcPts val="0"/>
-              </a:spcAft>
-              <a:buClr>
-                <a:srgbClr val="FFFFFF"/>
-              </a:buClr>
-              <a:buFont typeface="Helvetica Neue"/>
-              <a:buNone/>
-              <a:defRPr sz="3200" b="0" i="0" u="none" strike="noStrike" cap="none">
-                <a:solidFill>
-                  <a:srgbClr val="FFFFFF"/>
-                </a:solidFill>
-                <a:latin typeface="Helvetica Neue"/>
-                <a:ea typeface="Helvetica Neue"/>
-                <a:cs typeface="Helvetica Neue"/>
-                <a:sym typeface="Helvetica Neue"/>
-              </a:defRPr>
-            </a:lvl1pPr>
-            <a:lvl2pPr marL="0" marR="0" lvl="1" indent="228600" algn="ctr" rtl="0">
-              <a:lnSpc>
-                <a:spcPct val="100000"/>
-              </a:lnSpc>
-              <a:spcBef>
-                <a:spcPts val="0"/>
-              </a:spcBef>
-              <a:spcAft>
-                <a:spcPts val="0"/>
-              </a:spcAft>
-              <a:buClr>
-                <a:srgbClr val="FFFFFF"/>
-              </a:buClr>
-              <a:buFont typeface="Helvetica Neue"/>
-              <a:buNone/>
-              <a:defRPr sz="3200" b="0" i="0" u="none" strike="noStrike" cap="none">
-                <a:solidFill>
-                  <a:srgbClr val="FFFFFF"/>
-                </a:solidFill>
-                <a:latin typeface="Helvetica Neue"/>
-                <a:ea typeface="Helvetica Neue"/>
-                <a:cs typeface="Helvetica Neue"/>
-                <a:sym typeface="Helvetica Neue"/>
-              </a:defRPr>
-            </a:lvl2pPr>
-            <a:lvl3pPr marL="0" marR="0" lvl="2" indent="457200" algn="ctr" rtl="0">
-              <a:lnSpc>
-                <a:spcPct val="100000"/>
-              </a:lnSpc>
-              <a:spcBef>
-                <a:spcPts val="0"/>
-              </a:spcBef>
-              <a:spcAft>
-                <a:spcPts val="0"/>
-              </a:spcAft>
-              <a:buClr>
-                <a:srgbClr val="FFFFFF"/>
-              </a:buClr>
-              <a:buFont typeface="Helvetica Neue"/>
-              <a:buNone/>
-              <a:defRPr sz="3200" b="0" i="0" u="none" strike="noStrike" cap="none">
-                <a:solidFill>
-                  <a:srgbClr val="FFFFFF"/>
-                </a:solidFill>
-                <a:latin typeface="Helvetica Neue"/>
-                <a:ea typeface="Helvetica Neue"/>
-                <a:cs typeface="Helvetica Neue"/>
-                <a:sym typeface="Helvetica Neue"/>
-              </a:defRPr>
-            </a:lvl3pPr>
-            <a:lvl4pPr marL="0" marR="0" lvl="3" indent="685800" algn="ctr" rtl="0">
-              <a:lnSpc>
-                <a:spcPct val="100000"/>
-              </a:lnSpc>
-              <a:spcBef>
-                <a:spcPts val="0"/>
-              </a:spcBef>
-              <a:spcAft>
-                <a:spcPts val="0"/>
-              </a:spcAft>
-              <a:buClr>
-                <a:srgbClr val="FFFFFF"/>
-              </a:buClr>
-              <a:buFont typeface="Helvetica Neue"/>
-              <a:buNone/>
-              <a:defRPr sz="3200" b="0" i="0" u="none" strike="noStrike" cap="none">
-                <a:solidFill>
-                  <a:srgbClr val="FFFFFF"/>
-                </a:solidFill>
-                <a:latin typeface="Helvetica Neue"/>
-                <a:ea typeface="Helvetica Neue"/>
-                <a:cs typeface="Helvetica Neue"/>
-                <a:sym typeface="Helvetica Neue"/>
-              </a:defRPr>
-            </a:lvl4pPr>
-            <a:lvl5pPr marL="0" marR="0" lvl="4" indent="914400" algn="ctr" rtl="0">
-              <a:lnSpc>
-                <a:spcPct val="100000"/>
-              </a:lnSpc>
-              <a:spcBef>
-                <a:spcPts val="0"/>
-              </a:spcBef>
-              <a:spcAft>
-                <a:spcPts val="0"/>
-              </a:spcAft>
-              <a:buClr>
-                <a:srgbClr val="FFFFFF"/>
-              </a:buClr>
-              <a:buFont typeface="Helvetica Neue"/>
-              <a:buNone/>
-              <a:defRPr sz="3200" b="0" i="0" u="none" strike="noStrike" cap="none">
-                <a:solidFill>
-                  <a:srgbClr val="FFFFFF"/>
-                </a:solidFill>
-                <a:latin typeface="Helvetica Neue"/>
-                <a:ea typeface="Helvetica Neue"/>
-                <a:cs typeface="Helvetica Neue"/>
-                <a:sym typeface="Helvetica Neue"/>
-              </a:defRPr>
-            </a:lvl5pPr>
-            <a:lvl6pPr marL="2667000" marR="0" lvl="5" indent="-263525" algn="l" rtl="0">
-              <a:lnSpc>
-                <a:spcPct val="100000"/>
-              </a:lnSpc>
-              <a:spcBef>
-                <a:spcPts val="4200"/>
-              </a:spcBef>
-              <a:spcAft>
-                <a:spcPts val="0"/>
-              </a:spcAft>
-              <a:buClr>
-                <a:srgbClr val="FFFFFF"/>
-              </a:buClr>
-              <a:buSzPct val="75000"/>
-              <a:buFont typeface="Helvetica Neue"/>
-              <a:buChar char="•"/>
-              <a:defRPr sz="3800" b="0" i="0" u="none" strike="noStrike" cap="none">
-                <a:solidFill>
-                  <a:srgbClr val="FFFFFF"/>
-                </a:solidFill>
-                <a:latin typeface="Helvetica Neue"/>
-                <a:ea typeface="Helvetica Neue"/>
-                <a:cs typeface="Helvetica Neue"/>
-                <a:sym typeface="Helvetica Neue"/>
-              </a:defRPr>
-            </a:lvl6pPr>
-            <a:lvl7pPr marL="3111500" marR="0" lvl="6" indent="-263525" algn="l" rtl="0">
-              <a:lnSpc>
-                <a:spcPct val="100000"/>
-              </a:lnSpc>
-              <a:spcBef>
-                <a:spcPts val="4200"/>
-              </a:spcBef>
-              <a:spcAft>
-                <a:spcPts val="0"/>
-              </a:spcAft>
-              <a:buClr>
-                <a:srgbClr val="FFFFFF"/>
-              </a:buClr>
-              <a:buSzPct val="75000"/>
-              <a:buFont typeface="Helvetica Neue"/>
-              <a:buChar char="•"/>
-              <a:defRPr sz="3800" b="0" i="0" u="none" strike="noStrike" cap="none">
-                <a:solidFill>
-                  <a:srgbClr val="FFFFFF"/>
-                </a:solidFill>
-                <a:latin typeface="Helvetica Neue"/>
-                <a:ea typeface="Helvetica Neue"/>
-                <a:cs typeface="Helvetica Neue"/>
-                <a:sym typeface="Helvetica Neue"/>
-              </a:defRPr>
-            </a:lvl7pPr>
-            <a:lvl8pPr marL="3556000" marR="0" lvl="7" indent="-263525" algn="l" rtl="0">
-              <a:lnSpc>
-                <a:spcPct val="100000"/>
-              </a:lnSpc>
-              <a:spcBef>
-                <a:spcPts val="4200"/>
-              </a:spcBef>
-              <a:spcAft>
-                <a:spcPts val="0"/>
-              </a:spcAft>
-              <a:buClr>
-                <a:srgbClr val="FFFFFF"/>
-              </a:buClr>
-              <a:buSzPct val="75000"/>
-              <a:buFont typeface="Helvetica Neue"/>
-              <a:buChar char="•"/>
-              <a:defRPr sz="3800" b="0" i="0" u="none" strike="noStrike" cap="none">
-                <a:solidFill>
-                  <a:srgbClr val="FFFFFF"/>
-                </a:solidFill>
-                <a:latin typeface="Helvetica Neue"/>
-                <a:ea typeface="Helvetica Neue"/>
-                <a:cs typeface="Helvetica Neue"/>
-                <a:sym typeface="Helvetica Neue"/>
-              </a:defRPr>
-            </a:lvl8pPr>
-            <a:lvl9pPr marL="4000500" marR="0" lvl="8" indent="-263525" algn="l" rtl="0">
-              <a:lnSpc>
-                <a:spcPct val="100000"/>
-              </a:lnSpc>
-              <a:spcBef>
-                <a:spcPts val="4200"/>
-              </a:spcBef>
-              <a:spcAft>
-                <a:spcPts val="0"/>
-              </a:spcAft>
-              <a:buClr>
-                <a:srgbClr val="FFFFFF"/>
-              </a:buClr>
-              <a:buSzPct val="75000"/>
-              <a:buFont typeface="Helvetica Neue"/>
-              <a:buChar char="•"/>
-              <a:defRPr sz="3800" b="0" i="0" u="none" strike="noStrike" cap="none">
-                <a:solidFill>
-                  <a:srgbClr val="FFFFFF"/>
-                </a:solidFill>
-                <a:latin typeface="Helvetica Neue"/>
-                <a:ea typeface="Helvetica Neue"/>
-                <a:cs typeface="Helvetica Neue"/>
-                <a:sym typeface="Helvetica Neue"/>
-              </a:defRPr>
-            </a:lvl9pPr>
-          </a:lstStyle>
-          <a:p>
-            <a:endParaRPr/>
-          </a:p>
-        </p:txBody>
-      </p:sp>
-      <p:sp>
-        <p:nvSpPr>
-          <p:cNvPr id="21" name="Shape 21"/>
-          <p:cNvSpPr txBox="1">
-            <a:spLocks noGrp="1"/>
-          </p:cNvSpPr>
-          <p:nvPr>
-            <p:ph type="sldNum" idx="12"/>
-          </p:nvPr>
-        </p:nvSpPr>
-        <p:spPr>
-          <a:xfrm>
-            <a:off x="6311798" y="9258300"/>
-            <a:ext cx="368504" cy="381000"/>
-          </a:xfrm>
-          <a:prstGeom prst="rect">
-            <a:avLst/>
-          </a:prstGeom>
-          <a:noFill/>
-          <a:ln>
-            <a:noFill/>
-          </a:ln>
-        </p:spPr>
-        <p:txBody>
-          <a:bodyPr lIns="50800" tIns="50800" rIns="50800" bIns="50800" anchor="t" anchorCtr="0">
-            <a:noAutofit/>
-          </a:bodyPr>
-          <a:lstStyle/>
-          <a:p>
-            <a:pPr marL="0" marR="0" lvl="0" indent="0" algn="ctr" rtl="0">
-              <a:lnSpc>
-                <a:spcPct val="100000"/>
-              </a:lnSpc>
-              <a:spcBef>
-                <a:spcPts val="0"/>
-              </a:spcBef>
-              <a:spcAft>
-                <a:spcPts val="0"/>
-              </a:spcAft>
-              <a:buClr>
-                <a:srgbClr val="FFFFFF"/>
-              </a:buClr>
-              <a:buSzPct val="25000"/>
-              <a:buFont typeface="Helvetica Neue"/>
-              <a:buNone/>
-            </a:pPr>
-            <a:fld id="{00000000-1234-1234-1234-123412341234}" type="slidenum">
-              <a:rPr lang="en-US" sz="1800" b="0" i="0" u="none" strike="noStrike" cap="none">
-                <a:solidFill>
-                  <a:srgbClr val="FFFFFF"/>
-                </a:solidFill>
-                <a:latin typeface="Helvetica Neue"/>
-                <a:ea typeface="Helvetica Neue"/>
-                <a:cs typeface="Helvetica Neue"/>
-                <a:sym typeface="Helvetica Neue"/>
-              </a:rPr>
-              <a:t>‹#›</a:t>
-            </a:fld>
-            <a:endParaRPr lang="en-US" sz="1800" b="0" i="0" u="none" strike="noStrike" cap="none">
-              <a:solidFill>
-                <a:srgbClr val="FFFFFF"/>
-              </a:solidFill>
-              <a:latin typeface="Helvetica Neue"/>
-              <a:ea typeface="Helvetica Neue"/>
-              <a:cs typeface="Helvetica Neue"/>
-              <a:sym typeface="Helvetica Neue"/>
-            </a:endParaRPr>
-          </a:p>
-        </p:txBody>
-      </p:sp>
-    </p:spTree>
-  </p:cSld>
-  <p:clrMapOvr>
-    <a:masterClrMapping/>
-  </p:clrMapOvr>
-</p:sldLayout>
-</file>
-
-<file path=ppt/slideLayouts/slideLayout3.xml><?xml version="1.0" encoding="utf-8"?>
 <p:sldLayout xmlns:a="http://schemas.openxmlformats.org/drawingml/2006/main" xmlns:r="http://schemas.openxmlformats.org/officeDocument/2006/relationships" xmlns:p="http://schemas.openxmlformats.org/presentationml/2006/main">
   <p:cSld name="Title - Center">
     <p:spTree>
@@ -2706,7 +1839,7 @@
 </p:sldLayout>
 </file>
 
-<file path=ppt/slideLayouts/slideLayout4.xml><?xml version="1.0" encoding="utf-8"?>
+<file path=ppt/slideLayouts/slideLayout3.xml><?xml version="1.0" encoding="utf-8"?>
 <p:sldLayout xmlns:a="http://schemas.openxmlformats.org/drawingml/2006/main" xmlns:r="http://schemas.openxmlformats.org/officeDocument/2006/relationships" xmlns:p="http://schemas.openxmlformats.org/presentationml/2006/main">
   <p:cSld name="Photo - Vertical">
     <p:spTree>
@@ -3585,7 +2718,7 @@
 </p:sldLayout>
 </file>
 
-<file path=ppt/slideLayouts/slideLayout5.xml><?xml version="1.0" encoding="utf-8"?>
+<file path=ppt/slideLayouts/slideLayout4.xml><?xml version="1.0" encoding="utf-8"?>
 <p:sldLayout xmlns:a="http://schemas.openxmlformats.org/drawingml/2006/main" xmlns:r="http://schemas.openxmlformats.org/officeDocument/2006/relationships" xmlns:p="http://schemas.openxmlformats.org/presentationml/2006/main">
   <p:cSld name="Title - Top">
     <p:spTree>
@@ -3937,7 +3070,7 @@
 </p:sldLayout>
 </file>
 
-<file path=ppt/slideLayouts/slideLayout6.xml><?xml version="1.0" encoding="utf-8"?>
+<file path=ppt/slideLayouts/slideLayout5.xml><?xml version="1.0" encoding="utf-8"?>
 <p:sldLayout xmlns:a="http://schemas.openxmlformats.org/drawingml/2006/main" xmlns:r="http://schemas.openxmlformats.org/officeDocument/2006/relationships" xmlns:p="http://schemas.openxmlformats.org/presentationml/2006/main">
   <p:cSld name="Title, Bullets &amp; Photo">
     <p:spTree>
@@ -4821,7 +3954,7 @@
 </p:sldLayout>
 </file>
 
-<file path=ppt/slideLayouts/slideLayout7.xml><?xml version="1.0" encoding="utf-8"?>
+<file path=ppt/slideLayouts/slideLayout6.xml><?xml version="1.0" encoding="utf-8"?>
 <p:sldLayout xmlns:a="http://schemas.openxmlformats.org/drawingml/2006/main" xmlns:r="http://schemas.openxmlformats.org/officeDocument/2006/relationships" xmlns:p="http://schemas.openxmlformats.org/presentationml/2006/main">
   <p:cSld name="Photo - 3 Up">
     <p:spTree>
@@ -5714,7 +4847,7 @@
 </p:sldLayout>
 </file>
 
-<file path=ppt/slideLayouts/slideLayout8.xml><?xml version="1.0" encoding="utf-8"?>
+<file path=ppt/slideLayouts/slideLayout7.xml><?xml version="1.0" encoding="utf-8"?>
 <p:sldLayout xmlns:a="http://schemas.openxmlformats.org/drawingml/2006/main" xmlns:r="http://schemas.openxmlformats.org/officeDocument/2006/relationships" xmlns:p="http://schemas.openxmlformats.org/presentationml/2006/main">
   <p:cSld name="Quote">
     <p:spTree>
@@ -6339,7 +5472,7 @@
 </p:sldLayout>
 </file>
 
-<file path=ppt/slideLayouts/slideLayout9.xml><?xml version="1.0" encoding="utf-8"?>
+<file path=ppt/slideLayouts/slideLayout8.xml><?xml version="1.0" encoding="utf-8"?>
 <p:sldLayout xmlns:a="http://schemas.openxmlformats.org/drawingml/2006/main" xmlns:r="http://schemas.openxmlformats.org/officeDocument/2006/relationships" xmlns:p="http://schemas.openxmlformats.org/presentationml/2006/main">
   <p:cSld name="Photo">
     <p:spTree>
@@ -6625,6 +5758,101 @@
       <p:sp>
         <p:nvSpPr>
           <p:cNvPr id="52" name="Shape 52"/>
+          <p:cNvSpPr txBox="1">
+            <a:spLocks noGrp="1"/>
+          </p:cNvSpPr>
+          <p:nvPr>
+            <p:ph type="sldNum" idx="12"/>
+          </p:nvPr>
+        </p:nvSpPr>
+        <p:spPr>
+          <a:xfrm>
+            <a:off x="6311798" y="9258300"/>
+            <a:ext cx="368504" cy="381000"/>
+          </a:xfrm>
+          <a:prstGeom prst="rect">
+            <a:avLst/>
+          </a:prstGeom>
+          <a:noFill/>
+          <a:ln>
+            <a:noFill/>
+          </a:ln>
+        </p:spPr>
+        <p:txBody>
+          <a:bodyPr lIns="50800" tIns="50800" rIns="50800" bIns="50800" anchor="t" anchorCtr="0">
+            <a:noAutofit/>
+          </a:bodyPr>
+          <a:lstStyle/>
+          <a:p>
+            <a:pPr marL="0" marR="0" lvl="0" indent="0" algn="ctr" rtl="0">
+              <a:lnSpc>
+                <a:spcPct val="100000"/>
+              </a:lnSpc>
+              <a:spcBef>
+                <a:spcPts val="0"/>
+              </a:spcBef>
+              <a:spcAft>
+                <a:spcPts val="0"/>
+              </a:spcAft>
+              <a:buClr>
+                <a:srgbClr val="FFFFFF"/>
+              </a:buClr>
+              <a:buSzPct val="25000"/>
+              <a:buFont typeface="Helvetica Neue"/>
+              <a:buNone/>
+            </a:pPr>
+            <a:fld id="{00000000-1234-1234-1234-123412341234}" type="slidenum">
+              <a:rPr lang="en-US" sz="1800" b="0" i="0" u="none" strike="noStrike" cap="none">
+                <a:solidFill>
+                  <a:srgbClr val="FFFFFF"/>
+                </a:solidFill>
+                <a:latin typeface="Helvetica Neue"/>
+                <a:ea typeface="Helvetica Neue"/>
+                <a:cs typeface="Helvetica Neue"/>
+                <a:sym typeface="Helvetica Neue"/>
+              </a:rPr>
+              <a:t>‹#›</a:t>
+            </a:fld>
+            <a:endParaRPr lang="en-US" sz="1800" b="0" i="0" u="none" strike="noStrike" cap="none">
+              <a:solidFill>
+                <a:srgbClr val="FFFFFF"/>
+              </a:solidFill>
+              <a:latin typeface="Helvetica Neue"/>
+              <a:ea typeface="Helvetica Neue"/>
+              <a:cs typeface="Helvetica Neue"/>
+              <a:sym typeface="Helvetica Neue"/>
+            </a:endParaRPr>
+          </a:p>
+        </p:txBody>
+      </p:sp>
+    </p:spTree>
+  </p:cSld>
+  <p:clrMapOvr>
+    <a:masterClrMapping/>
+  </p:clrMapOvr>
+</p:sldLayout>
+</file>
+
+<file path=ppt/slideLayouts/slideLayout9.xml><?xml version="1.0" encoding="utf-8"?>
+<p:sldLayout xmlns:a="http://schemas.openxmlformats.org/drawingml/2006/main" xmlns:r="http://schemas.openxmlformats.org/officeDocument/2006/relationships" xmlns:p="http://schemas.openxmlformats.org/presentationml/2006/main">
+  <p:cSld name="Blank">
+    <p:spTree>
+      <p:nvGrpSpPr>
+        <p:cNvPr id="1" name="Shape 53"/>
+        <p:cNvGrpSpPr/>
+        <p:nvPr/>
+      </p:nvGrpSpPr>
+      <p:grpSpPr>
+        <a:xfrm>
+          <a:off x="0" y="0"/>
+          <a:ext cx="0" cy="0"/>
+          <a:chOff x="0" y="0"/>
+          <a:chExt cx="0" cy="0"/>
+        </a:xfrm>
+      </p:grpSpPr>
+      <p:sp>
+        <p:nvSpPr>
+          <p:cNvPr id="54" name="Shape 54"/>
           <p:cNvSpPr txBox="1">
             <a:spLocks noGrp="1"/>
           </p:cNvSpPr>
@@ -7323,15 +6551,14 @@
   <p:clrMap bg1="lt1" tx1="dk1" bg2="dk2" tx2="lt2" accent1="accent1" accent2="accent2" accent3="accent3" accent4="accent4" accent5="accent5" accent6="accent6" hlink="hlink" folHlink="folHlink"/>
   <p:sldLayoutIdLst>
     <p:sldLayoutId id="2147483649" r:id="rId1"/>
-    <p:sldLayoutId id="2147483650" r:id="rId2"/>
-    <p:sldLayoutId id="2147483651" r:id="rId3"/>
-    <p:sldLayoutId id="2147483652" r:id="rId4"/>
-    <p:sldLayoutId id="2147483653" r:id="rId5"/>
-    <p:sldLayoutId id="2147483654" r:id="rId6"/>
-    <p:sldLayoutId id="2147483656" r:id="rId7"/>
-    <p:sldLayoutId id="2147483657" r:id="rId8"/>
-    <p:sldLayoutId id="2147483658" r:id="rId9"/>
-    <p:sldLayoutId id="2147483659" r:id="rId10"/>
+    <p:sldLayoutId id="2147483651" r:id="rId2"/>
+    <p:sldLayoutId id="2147483652" r:id="rId3"/>
+    <p:sldLayoutId id="2147483653" r:id="rId4"/>
+    <p:sldLayoutId id="2147483654" r:id="rId5"/>
+    <p:sldLayoutId id="2147483656" r:id="rId6"/>
+    <p:sldLayoutId id="2147483657" r:id="rId7"/>
+    <p:sldLayoutId id="2147483658" r:id="rId8"/>
+    <p:sldLayoutId id="2147483659" r:id="rId9"/>
   </p:sldLayoutIdLst>
   <p:hf sldNum="0" hdr="0" ftr="0" dt="0"/>
   <p:txStyles>
@@ -7891,7 +7118,6 @@
               <a:rPr lang="en-US" dirty="0" smtClean="0"/>
               <a:t>HTML + CSS</a:t>
             </a:r>
-            <a:endParaRPr lang="en-US" dirty="0" smtClean="0"/>
           </a:p>
           <a:p>
             <a:pPr marL="923925" indent="-742950">
@@ -7955,11 +7181,7 @@
             </a:pPr>
             <a:r>
               <a:rPr lang="en-US" dirty="0" smtClean="0"/>
-              <a:t>Frontend </a:t>
-            </a:r>
-            <a:r>
-              <a:rPr lang="en-US" dirty="0" smtClean="0"/>
-              <a:t>tooling</a:t>
+              <a:t>Frontend tooling</a:t>
             </a:r>
           </a:p>
           <a:p>
@@ -7993,6 +7215,13 @@
   <p:clrMapOvr>
     <a:masterClrMapping/>
   </p:clrMapOvr>
+  <p:timing>
+    <p:tnLst>
+      <p:par>
+        <p:cTn id="1" dur="indefinite" restart="never" nodeType="tmRoot"/>
+      </p:par>
+    </p:tnLst>
+  </p:timing>
 </p:sld>
 </file>
 
@@ -8096,7 +7325,6 @@
               <a:rPr lang="en-US" dirty="0" smtClean="0"/>
               <a:t>Angular</a:t>
             </a:r>
-            <a:endParaRPr lang="en-US" dirty="0" smtClean="0"/>
           </a:p>
           <a:p>
             <a:pPr marL="923925" indent="-742950">
@@ -8208,6 +7436,136 @@
   <p:clrMapOvr>
     <a:masterClrMapping/>
   </p:clrMapOvr>
+  <p:timing>
+    <p:tnLst>
+      <p:par>
+        <p:cTn id="1" dur="indefinite" restart="never" nodeType="tmRoot"/>
+      </p:par>
+    </p:tnLst>
+  </p:timing>
+</p:sld>
+</file>
+
+<file path=ppt/slides/slide3.xml><?xml version="1.0" encoding="utf-8"?>
+<p:sld xmlns:a="http://schemas.openxmlformats.org/drawingml/2006/main" xmlns:r="http://schemas.openxmlformats.org/officeDocument/2006/relationships" xmlns:p="http://schemas.openxmlformats.org/presentationml/2006/main">
+  <p:cSld>
+    <p:spTree>
+      <p:nvGrpSpPr>
+        <p:cNvPr id="1" name="Shape 64"/>
+        <p:cNvGrpSpPr/>
+        <p:nvPr/>
+      </p:nvGrpSpPr>
+      <p:grpSpPr>
+        <a:xfrm>
+          <a:off x="0" y="0"/>
+          <a:ext cx="0" cy="0"/>
+          <a:chOff x="0" y="0"/>
+          <a:chExt cx="0" cy="0"/>
+        </a:xfrm>
+      </p:grpSpPr>
+      <p:sp>
+        <p:nvSpPr>
+          <p:cNvPr id="65" name="Shape 65"/>
+          <p:cNvSpPr txBox="1">
+            <a:spLocks noGrp="1"/>
+          </p:cNvSpPr>
+          <p:nvPr>
+            <p:ph type="title"/>
+          </p:nvPr>
+        </p:nvSpPr>
+        <p:spPr>
+          <a:xfrm>
+            <a:off x="952500" y="254000"/>
+            <a:ext cx="11099700" cy="2159100"/>
+          </a:xfrm>
+          <a:prstGeom prst="rect">
+            <a:avLst/>
+          </a:prstGeom>
+        </p:spPr>
+        <p:txBody>
+          <a:bodyPr lIns="91425" tIns="91425" rIns="91425" bIns="91425" anchor="ctr" anchorCtr="0">
+            <a:noAutofit/>
+          </a:bodyPr>
+          <a:lstStyle/>
+          <a:p>
+            <a:pPr lvl="0">
+              <a:spcBef>
+                <a:spcPts val="0"/>
+              </a:spcBef>
+              <a:buNone/>
+            </a:pPr>
+            <a:endParaRPr lang="en-US" dirty="0">
+              <a:solidFill>
+                <a:srgbClr val="FFC000"/>
+              </a:solidFill>
+            </a:endParaRPr>
+          </a:p>
+        </p:txBody>
+      </p:sp>
+      <p:sp>
+        <p:nvSpPr>
+          <p:cNvPr id="66" name="Shape 66"/>
+          <p:cNvSpPr txBox="1">
+            <a:spLocks noGrp="1"/>
+          </p:cNvSpPr>
+          <p:nvPr>
+            <p:ph type="body" idx="1"/>
+          </p:nvPr>
+        </p:nvSpPr>
+        <p:spPr>
+          <a:xfrm>
+            <a:off x="2823599" y="2413100"/>
+            <a:ext cx="8805183" cy="6286500"/>
+          </a:xfrm>
+          <a:prstGeom prst="rect">
+            <a:avLst/>
+          </a:prstGeom>
+        </p:spPr>
+        <p:txBody>
+          <a:bodyPr lIns="91425" tIns="91425" rIns="91425" bIns="91425" anchor="ctr" anchorCtr="0">
+            <a:noAutofit/>
+          </a:bodyPr>
+          <a:lstStyle/>
+          <a:p>
+            <a:pPr marL="180975" indent="0">
+              <a:spcBef>
+                <a:spcPts val="0"/>
+              </a:spcBef>
+              <a:buNone/>
+            </a:pPr>
+            <a:r>
+              <a:rPr lang="en-US" dirty="0"/>
+              <a:t>https://</a:t>
+            </a:r>
+            <a:r>
+              <a:rPr lang="en-US" dirty="0" err="1"/>
+              <a:t>github.com</a:t>
+            </a:r>
+            <a:r>
+              <a:rPr lang="en-US" dirty="0"/>
+              <a:t>/petereijgermans11/frontend-cursus</a:t>
+            </a:r>
+            <a:endParaRPr lang="en-US" dirty="0"/>
+          </a:p>
+        </p:txBody>
+      </p:sp>
+    </p:spTree>
+    <p:extLst>
+      <p:ext uri="{BB962C8B-B14F-4D97-AF65-F5344CB8AC3E}">
+        <p14:creationId xmlns:p14="http://schemas.microsoft.com/office/powerpoint/2010/main" val="2015302614"/>
+      </p:ext>
+    </p:extLst>
+  </p:cSld>
+  <p:clrMapOvr>
+    <a:masterClrMapping/>
+  </p:clrMapOvr>
+  <p:timing>
+    <p:tnLst>
+      <p:par>
+        <p:cTn id="1" dur="indefinite" restart="never" nodeType="tmRoot"/>
+      </p:par>
+    </p:tnLst>
+  </p:timing>
 </p:sld>
 </file>
 

</xml_diff>

<commit_message>
chanhged PPT frontend course
</commit_message>
<xml_diff>
--- a/frontend-cursus/ 0 - Agenda.pptx
+++ b/frontend-cursus/ 0 - Agenda.pptx
@@ -7471,11 +7471,14 @@
               </a:spcBef>
               <a:buNone/>
             </a:pPr>
-            <a:endParaRPr lang="en-US" dirty="0">
-              <a:solidFill>
-                <a:srgbClr val="FFC000"/>
-              </a:solidFill>
-            </a:endParaRPr>
+            <a:r>
+              <a:rPr lang="en-US" dirty="0">
+                <a:solidFill>
+                  <a:srgbClr val="FFC000"/>
+                </a:solidFill>
+              </a:rPr>
+              <a:t>Recommended Site</a:t>
+            </a:r>
           </a:p>
         </p:txBody>
       </p:sp>
@@ -7510,21 +7513,104 @@
               </a:spcBef>
               <a:buNone/>
             </a:pPr>
+            <a:endParaRPr lang="en-US" dirty="0"/>
+          </a:p>
+          <a:p>
+            <a:pPr marL="180975" indent="0">
+              <a:spcBef>
+                <a:spcPts val="0"/>
+              </a:spcBef>
+              <a:buNone/>
+            </a:pPr>
+            <a:endParaRPr lang="en-US" dirty="0"/>
+          </a:p>
+          <a:p>
+            <a:pPr marL="180975" indent="0">
+              <a:spcBef>
+                <a:spcPts val="0"/>
+              </a:spcBef>
+              <a:buNone/>
+            </a:pPr>
+            <a:endParaRPr lang="en-US" dirty="0"/>
+          </a:p>
+          <a:p>
+            <a:pPr marL="180975" indent="0">
+              <a:spcBef>
+                <a:spcPts val="0"/>
+              </a:spcBef>
+              <a:buNone/>
+            </a:pPr>
+            <a:endParaRPr lang="en-US" dirty="0"/>
+          </a:p>
+          <a:p>
+            <a:pPr marL="180975" indent="0">
+              <a:spcBef>
+                <a:spcPts val="0"/>
+              </a:spcBef>
+              <a:buNone/>
+            </a:pPr>
             <a:r>
               <a:rPr lang="en-US" dirty="0"/>
               <a:t>https://</a:t>
             </a:r>
             <a:r>
               <a:rPr lang="en-US" dirty="0" err="1"/>
-              <a:t>github.com</a:t>
+              <a:t>www.freecodecamp.org</a:t>
             </a:r>
             <a:r>
               <a:rPr lang="en-US" dirty="0"/>
-              <a:t>/petereijgermans11/frontend-cursus</a:t>
+              <a:t>/news/a-practical-guide-to-learning-front-end-development-for-beginners-da6516505e41/</a:t>
             </a:r>
           </a:p>
         </p:txBody>
       </p:sp>
+      <p:pic>
+        <p:nvPicPr>
+          <p:cNvPr id="1028" name="Picture 4">
+            <a:extLst>
+              <a:ext uri="{FF2B5EF4-FFF2-40B4-BE49-F238E27FC236}">
+                <a16:creationId xmlns:a16="http://schemas.microsoft.com/office/drawing/2014/main" id="{F1BBF4DE-52C4-2A47-85CE-B9AC6AD82910}"/>
+              </a:ext>
+            </a:extLst>
+          </p:cNvPr>
+          <p:cNvPicPr>
+            <a:picLocks noChangeAspect="1" noChangeArrowheads="1"/>
+          </p:cNvPicPr>
+          <p:nvPr/>
+        </p:nvPicPr>
+        <p:blipFill>
+          <a:blip r:embed="rId3">
+            <a:extLst>
+              <a:ext uri="{28A0092B-C50C-407E-A947-70E740481C1C}">
+                <a14:useLocalDpi xmlns:a14="http://schemas.microsoft.com/office/drawing/2010/main" val="0"/>
+              </a:ext>
+            </a:extLst>
+          </a:blip>
+          <a:srcRect/>
+          <a:stretch>
+            <a:fillRect/>
+          </a:stretch>
+        </p:blipFill>
+        <p:spPr bwMode="auto">
+          <a:xfrm>
+            <a:off x="1475603" y="2083633"/>
+            <a:ext cx="5614746" cy="3158295"/>
+          </a:xfrm>
+          <a:prstGeom prst="rect">
+            <a:avLst/>
+          </a:prstGeom>
+          <a:noFill/>
+          <a:extLst>
+            <a:ext uri="{909E8E84-426E-40DD-AFC4-6F175D3DCCD1}">
+              <a14:hiddenFill xmlns:a14="http://schemas.microsoft.com/office/drawing/2010/main">
+                <a:solidFill>
+                  <a:srgbClr val="FFFFFF"/>
+                </a:solidFill>
+              </a14:hiddenFill>
+            </a:ext>
+          </a:extLst>
+        </p:spPr>
+      </p:pic>
     </p:spTree>
     <p:extLst>
       <p:ext uri="{BB962C8B-B14F-4D97-AF65-F5344CB8AC3E}">

</xml_diff>